<commit_message>
Case II and Case III
</commit_message>
<xml_diff>
--- a/Lessons/class5A/Class5A.pptx
+++ b/Lessons/class5A/Class5A.pptx
@@ -8244,28 +8244,6 @@
             <a:r>
               <a:rPr lang="en-US" dirty="0"/>
               <a:t> Regression</a:t>
-            </a:r>
-          </a:p>
-        </p:txBody>
-      </p:sp>
-      <p:sp>
-        <p:nvSpPr>
-          <p:cNvPr id="3" name="Subtitle 2"/>
-          <p:cNvSpPr>
-            <a:spLocks noGrp="1"/>
-          </p:cNvSpPr>
-          <p:nvPr>
-            <p:ph type="subTitle" idx="1"/>
-          </p:nvPr>
-        </p:nvSpPr>
-        <p:spPr/>
-        <p:txBody>
-          <a:bodyPr/>
-          <a:lstStyle/>
-          <a:p>
-            <a:r>
-              <a:rPr lang="en-US" dirty="0"/>
-              <a:t>Ted Kwartler</a:t>
             </a:r>
           </a:p>
         </p:txBody>

</xml_diff>